<commit_message>
Something got edited in the slides but idk what
</commit_message>
<xml_diff>
--- a/resources/31march/G1T3_Presentation.pptx
+++ b/resources/31march/G1T3_Presentation.pptx
@@ -134,14 +134,14 @@
 <file path=ppt/revisionInfo.xml><?xml version="1.0" encoding="utf-8"?>
 <p1510:revInfo xmlns:a="http://schemas.openxmlformats.org/drawingml/2006/main" xmlns:r="http://schemas.openxmlformats.org/officeDocument/2006/relationships" xmlns:p1510="http://schemas.microsoft.com/office/powerpoint/2015/10/main">
   <p1510:revLst>
+    <p1510:client id="{E8120537-77E8-26E0-51C0-F28A1AC0AB06}" v="85" dt="2019-03-31T13:52:10.847"/>
+    <p1510:client id="{B1AA9147-4770-FA85-D724-2412576C8B8D}" v="1" dt="2019-04-01T02:21:53.265"/>
     <p1510:client id="{48A0B779-C6F2-7D1B-252B-50A074E2F95E}" v="2" dt="2019-03-31T16:38:36.858"/>
     <p1510:client id="{61435D8E-A768-4560-9C9E-FD1392AF4C76}" v="17" dt="2019-03-31T16:27:53.901"/>
-    <p1510:client id="{E8120537-77E8-26E0-51C0-F28A1AC0AB06}" v="85" dt="2019-03-31T13:52:10.847"/>
-    <p1510:client id="{B1AA9147-4770-FA85-D724-2412576C8B8D}" v="1" dt="2019-04-01T02:21:53.265"/>
     <p1510:client id="{0594DB9F-9B20-3582-377B-C8582E21F78E}" v="1" dt="2019-03-31T14:06:46.385"/>
     <p1510:client id="{16D884F8-E973-AE95-312C-891E5F141670}" v="2" dt="2019-03-31T15:51:48.530"/>
+    <p1510:client id="{C8F0F47E-147B-336D-133C-2506F2DE38CE}" v="28" dt="2019-03-31T17:31:16.069"/>
     <p1510:client id="{294D2CDE-5FBE-4786-F66A-F88BD17D6793}" v="453" dt="2019-03-31T18:40:13.422"/>
-    <p1510:client id="{C8F0F47E-147B-336D-133C-2506F2DE38CE}" v="28" dt="2019-03-31T17:31:16.069"/>
     <p1510:client id="{365EE1DC-E0CC-4929-8BEF-4313C288DF3D}" v="918" dt="2019-04-01T06:06:28.060"/>
     <p1510:client id="{196B78AE-0E47-471D-9537-9CF3A5AE6AD0}" v="1262" vWet="1263" dt="2019-04-01T05:22:05.524"/>
     <p1510:client id="{C76E3632-0027-49E7-569E-FF7EDC3506BA}" v="6" dt="2019-04-01T02:29:54.500"/>
@@ -3410,7 +3410,7 @@
           <a:p>
             <a:fld id="{5EB4ED90-C00C-457B-9CA6-4E39394CCA00}" type="datetimeFigureOut">
               <a:rPr lang="en-US" smtClean="0"/>
-              <a:t>3/31/2019</a:t>
+              <a:t>4/1/2019</a:t>
             </a:fld>
             <a:endParaRPr lang="en-US"/>
           </a:p>
@@ -4310,7 +4310,7 @@
           <a:p>
             <a:fld id="{846CE7D5-CF57-46EF-B807-FDD0502418D4}" type="datetimeFigureOut">
               <a:rPr lang="en-US" smtClean="0"/>
-              <a:t>3/31/2019</a:t>
+              <a:t>4/1/2019</a:t>
             </a:fld>
             <a:endParaRPr lang="en-US"/>
           </a:p>
@@ -4478,7 +4478,7 @@
           <a:p>
             <a:fld id="{846CE7D5-CF57-46EF-B807-FDD0502418D4}" type="datetimeFigureOut">
               <a:rPr lang="en-US" smtClean="0"/>
-              <a:t>3/31/2019</a:t>
+              <a:t>4/1/2019</a:t>
             </a:fld>
             <a:endParaRPr lang="en-US"/>
           </a:p>
@@ -4656,7 +4656,7 @@
           <a:p>
             <a:fld id="{846CE7D5-CF57-46EF-B807-FDD0502418D4}" type="datetimeFigureOut">
               <a:rPr lang="en-US" smtClean="0"/>
-              <a:t>3/31/2019</a:t>
+              <a:t>4/1/2019</a:t>
             </a:fld>
             <a:endParaRPr lang="en-US"/>
           </a:p>
@@ -4824,7 +4824,7 @@
           <a:p>
             <a:fld id="{846CE7D5-CF57-46EF-B807-FDD0502418D4}" type="datetimeFigureOut">
               <a:rPr lang="en-US" smtClean="0"/>
-              <a:t>3/31/2019</a:t>
+              <a:t>4/1/2019</a:t>
             </a:fld>
             <a:endParaRPr lang="en-US"/>
           </a:p>
@@ -5141,7 +5141,7 @@
           <a:p>
             <a:fld id="{846CE7D5-CF57-46EF-B807-FDD0502418D4}" type="datetimeFigureOut">
               <a:rPr lang="en-US" smtClean="0"/>
-              <a:t>3/31/2019</a:t>
+              <a:t>4/1/2019</a:t>
             </a:fld>
             <a:endParaRPr lang="en-US"/>
           </a:p>
@@ -5370,7 +5370,7 @@
           <a:p>
             <a:fld id="{846CE7D5-CF57-46EF-B807-FDD0502418D4}" type="datetimeFigureOut">
               <a:rPr lang="en-US" smtClean="0"/>
-              <a:t>3/31/2019</a:t>
+              <a:t>4/1/2019</a:t>
             </a:fld>
             <a:endParaRPr lang="en-US"/>
           </a:p>
@@ -5734,7 +5734,7 @@
           <a:p>
             <a:fld id="{846CE7D5-CF57-46EF-B807-FDD0502418D4}" type="datetimeFigureOut">
               <a:rPr lang="en-US" smtClean="0"/>
-              <a:t>3/31/2019</a:t>
+              <a:t>4/1/2019</a:t>
             </a:fld>
             <a:endParaRPr lang="en-US"/>
           </a:p>
@@ -5851,7 +5851,7 @@
           <a:p>
             <a:fld id="{846CE7D5-CF57-46EF-B807-FDD0502418D4}" type="datetimeFigureOut">
               <a:rPr lang="en-US" smtClean="0"/>
-              <a:t>3/31/2019</a:t>
+              <a:t>4/1/2019</a:t>
             </a:fld>
             <a:endParaRPr lang="en-US"/>
           </a:p>
@@ -5946,7 +5946,7 @@
           <a:p>
             <a:fld id="{846CE7D5-CF57-46EF-B807-FDD0502418D4}" type="datetimeFigureOut">
               <a:rPr lang="en-US" smtClean="0"/>
-              <a:t>3/31/2019</a:t>
+              <a:t>4/1/2019</a:t>
             </a:fld>
             <a:endParaRPr lang="en-US"/>
           </a:p>
@@ -6221,7 +6221,7 @@
           <a:p>
             <a:fld id="{846CE7D5-CF57-46EF-B807-FDD0502418D4}" type="datetimeFigureOut">
               <a:rPr lang="en-US" smtClean="0"/>
-              <a:t>3/31/2019</a:t>
+              <a:t>4/1/2019</a:t>
             </a:fld>
             <a:endParaRPr lang="en-US"/>
           </a:p>
@@ -6476,7 +6476,7 @@
           <a:p>
             <a:fld id="{846CE7D5-CF57-46EF-B807-FDD0502418D4}" type="datetimeFigureOut">
               <a:rPr lang="en-US" smtClean="0"/>
-              <a:t>3/31/2019</a:t>
+              <a:t>4/1/2019</a:t>
             </a:fld>
             <a:endParaRPr lang="en-US"/>
           </a:p>
@@ -6687,7 +6687,7 @@
           <a:p>
             <a:fld id="{846CE7D5-CF57-46EF-B807-FDD0502418D4}" type="datetimeFigureOut">
               <a:rPr lang="en-US" smtClean="0"/>
-              <a:t>3/31/2019</a:t>
+              <a:t>4/1/2019</a:t>
             </a:fld>
             <a:endParaRPr lang="en-US"/>
           </a:p>
@@ -7207,7 +7207,7 @@
         </p:spPr>
         <p:txBody>
           <a:bodyPr vert="horz" lIns="91440" tIns="45720" rIns="91440" bIns="45720" rtlCol="0" anchor="ctr">
-            <a:normAutofit/>
+            <a:normAutofit lnSpcReduction="10000"/>
           </a:bodyPr>
           <a:lstStyle>
             <a:lvl1pPr algn="l" defTabSz="914400" rtl="0" eaLnBrk="1" latinLnBrk="0" hangingPunct="1">
@@ -7585,7 +7585,7 @@
           <p:nvPr/>
         </p:nvPicPr>
         <p:blipFill>
-          <a:blip r:embed="rId3">
+          <a:blip r:embed="rId3" cstate="print">
             <a:extLst>
               <a:ext uri="{28A0092B-C50C-407E-A947-70E740481C1C}">
                 <a14:useLocalDpi xmlns:a14="http://schemas.microsoft.com/office/drawing/2010/main" val="0"/>
@@ -7632,7 +7632,7 @@
           <p:nvPr/>
         </p:nvPicPr>
         <p:blipFill>
-          <a:blip r:embed="rId3">
+          <a:blip r:embed="rId4" cstate="print">
             <a:extLst>
               <a:ext uri="{28A0092B-C50C-407E-A947-70E740481C1C}">
                 <a14:useLocalDpi xmlns:a14="http://schemas.microsoft.com/office/drawing/2010/main" val="0"/>
@@ -7679,7 +7679,7 @@
           <p:nvPr/>
         </p:nvPicPr>
         <p:blipFill>
-          <a:blip r:embed="rId3">
+          <a:blip r:embed="rId3" cstate="print">
             <a:extLst>
               <a:ext uri="{28A0092B-C50C-407E-A947-70E740481C1C}">
                 <a14:useLocalDpi xmlns:a14="http://schemas.microsoft.com/office/drawing/2010/main" val="0"/>
@@ -7726,7 +7726,7 @@
           <p:nvPr/>
         </p:nvPicPr>
         <p:blipFill>
-          <a:blip r:embed="rId3">
+          <a:blip r:embed="rId3" cstate="print">
             <a:extLst>
               <a:ext uri="{28A0092B-C50C-407E-A947-70E740481C1C}">
                 <a14:useLocalDpi xmlns:a14="http://schemas.microsoft.com/office/drawing/2010/main" val="0"/>
@@ -9736,7 +9736,7 @@
           <p:nvPr/>
         </p:nvPicPr>
         <p:blipFill rotWithShape="1">
-          <a:blip r:embed="rId4">
+          <a:blip r:embed="rId5">
             <a:extLst>
               <a:ext uri="{28A0092B-C50C-407E-A947-70E740481C1C}">
                 <a14:useLocalDpi xmlns:a14="http://schemas.microsoft.com/office/drawing/2010/main" val="0"/>
@@ -9781,7 +9781,7 @@
           <p:nvPr/>
         </p:nvPicPr>
         <p:blipFill rotWithShape="1">
-          <a:blip r:embed="rId4">
+          <a:blip r:embed="rId5">
             <a:extLst>
               <a:ext uri="{28A0092B-C50C-407E-A947-70E740481C1C}">
                 <a14:useLocalDpi xmlns:a14="http://schemas.microsoft.com/office/drawing/2010/main" val="0"/>
@@ -9826,7 +9826,7 @@
           <p:nvPr/>
         </p:nvPicPr>
         <p:blipFill rotWithShape="1">
-          <a:blip r:embed="rId4">
+          <a:blip r:embed="rId5">
             <a:extLst>
               <a:ext uri="{28A0092B-C50C-407E-A947-70E740481C1C}">
                 <a14:useLocalDpi xmlns:a14="http://schemas.microsoft.com/office/drawing/2010/main" val="0"/>
@@ -10055,7 +10055,7 @@
           <p:nvPr/>
         </p:nvPicPr>
         <p:blipFill>
-          <a:blip r:embed="rId5">
+          <a:blip r:embed="rId6" cstate="print">
             <a:extLst>
               <a:ext uri="{28A0092B-C50C-407E-A947-70E740481C1C}">
                 <a14:useLocalDpi xmlns:a14="http://schemas.microsoft.com/office/drawing/2010/main" val="0"/>
@@ -10800,7 +10800,7 @@
           <p:nvPr/>
         </p:nvPicPr>
         <p:blipFill>
-          <a:blip r:embed="rId3">
+          <a:blip r:embed="rId3" cstate="print">
             <a:extLst>
               <a:ext uri="{28A0092B-C50C-407E-A947-70E740481C1C}">
                 <a14:useLocalDpi xmlns:a14="http://schemas.microsoft.com/office/drawing/2010/main" val="0"/>
@@ -11451,7 +11451,7 @@
           <p:nvPr/>
         </p:nvPicPr>
         <p:blipFill>
-          <a:blip r:embed="rId3">
+          <a:blip r:embed="rId3" cstate="print">
             <a:extLst>
               <a:ext uri="{28A0092B-C50C-407E-A947-70E740481C1C}">
                 <a14:useLocalDpi xmlns:a14="http://schemas.microsoft.com/office/drawing/2010/main" val="0"/>
@@ -11986,7 +11986,7 @@
           <p:nvPr/>
         </p:nvPicPr>
         <p:blipFill>
-          <a:blip r:embed="rId4">
+          <a:blip r:embed="rId4" cstate="print">
             <a:extLst>
               <a:ext uri="{28A0092B-C50C-407E-A947-70E740481C1C}">
                 <a14:useLocalDpi xmlns:a14="http://schemas.microsoft.com/office/drawing/2010/main" val="0"/>
@@ -14279,7 +14279,7 @@
           <p:nvPr/>
         </p:nvPicPr>
         <p:blipFill>
-          <a:blip r:embed="rId3">
+          <a:blip r:embed="rId3" cstate="print">
             <a:extLst>
               <a:ext uri="{28A0092B-C50C-407E-A947-70E740481C1C}">
                 <a14:useLocalDpi xmlns:a14="http://schemas.microsoft.com/office/drawing/2010/main" val="0"/>
@@ -15068,7 +15068,7 @@
           <p:nvPr/>
         </p:nvPicPr>
         <p:blipFill>
-          <a:blip r:embed="rId5">
+          <a:blip r:embed="rId5" cstate="print">
             <a:extLst>
               <a:ext uri="{28A0092B-C50C-407E-A947-70E740481C1C}">
                 <a14:useLocalDpi xmlns:a14="http://schemas.microsoft.com/office/drawing/2010/main" val="0"/>
@@ -15230,7 +15230,7 @@
 </file>
 
 <file path=ppt/slides/slide2.xml><?xml version="1.0" encoding="utf-8"?>
-<p:sld xmlns:a="http://schemas.openxmlformats.org/drawingml/2006/main" xmlns:r="http://schemas.openxmlformats.org/officeDocument/2006/relationships" xmlns:p="http://schemas.openxmlformats.org/presentationml/2006/main">
+<p:sld xmlns:a="http://schemas.openxmlformats.org/drawingml/2006/main" xmlns:r="http://schemas.openxmlformats.org/officeDocument/2006/relationships" xmlns:p="http://schemas.openxmlformats.org/presentationml/2006/main" show="0">
   <p:cSld>
     <p:spTree>
       <p:nvGrpSpPr>
@@ -15449,7 +15449,7 @@
           <p:nvPr/>
         </p:nvPicPr>
         <p:blipFill>
-          <a:blip r:embed="rId2">
+          <a:blip r:embed="rId2" cstate="print">
             <a:extLst>
               <a:ext uri="{28A0092B-C50C-407E-A947-70E740481C1C}">
                 <a14:useLocalDpi xmlns:a14="http://schemas.microsoft.com/office/drawing/2010/main" val="0"/>
@@ -15835,7 +15835,7 @@
             <p:nvPr/>
           </p:nvPicPr>
           <p:blipFill>
-            <a:blip r:embed="rId4">
+            <a:blip r:embed="rId4" cstate="print">
               <a:extLst>
                 <a:ext uri="{28A0092B-C50C-407E-A947-70E740481C1C}">
                   <a14:useLocalDpi xmlns:a14="http://schemas.microsoft.com/office/drawing/2010/main" val="0"/>
@@ -15989,7 +15989,7 @@
             <p:nvPr/>
           </p:nvPicPr>
           <p:blipFill>
-            <a:blip r:embed="rId5">
+            <a:blip r:embed="rId5" cstate="print">
               <a:extLst>
                 <a:ext uri="{28A0092B-C50C-407E-A947-70E740481C1C}">
                   <a14:useLocalDpi xmlns:a14="http://schemas.microsoft.com/office/drawing/2010/main" val="0"/>
@@ -16148,7 +16148,7 @@
             <p:nvPr/>
           </p:nvPicPr>
           <p:blipFill>
-            <a:blip r:embed="rId6">
+            <a:blip r:embed="rId6" cstate="print">
               <a:extLst>
                 <a:ext uri="{28A0092B-C50C-407E-A947-70E740481C1C}">
                   <a14:useLocalDpi xmlns:a14="http://schemas.microsoft.com/office/drawing/2010/main" val="0"/>
@@ -16298,7 +16298,7 @@
             <p:nvPr/>
           </p:nvPicPr>
           <p:blipFill>
-            <a:blip r:embed="rId7">
+            <a:blip r:embed="rId7" cstate="print">
               <a:extLst>
                 <a:ext uri="{28A0092B-C50C-407E-A947-70E740481C1C}">
                   <a14:useLocalDpi xmlns:a14="http://schemas.microsoft.com/office/drawing/2010/main" val="0"/>
@@ -16457,7 +16457,7 @@
             <p:nvPr/>
           </p:nvPicPr>
           <p:blipFill>
-            <a:blip r:embed="rId8">
+            <a:blip r:embed="rId8" cstate="print">
               <a:extLst>
                 <a:ext uri="{28A0092B-C50C-407E-A947-70E740481C1C}">
                   <a14:useLocalDpi xmlns:a14="http://schemas.microsoft.com/office/drawing/2010/main" val="0"/>
@@ -16554,7 +16554,7 @@
           <p:nvPr/>
         </p:nvPicPr>
         <p:blipFill>
-          <a:blip r:embed="rId4">
+          <a:blip r:embed="rId4" cstate="print">
             <a:extLst>
               <a:ext uri="{28A0092B-C50C-407E-A947-70E740481C1C}">
                 <a14:useLocalDpi xmlns:a14="http://schemas.microsoft.com/office/drawing/2010/main" val="0"/>
@@ -16620,7 +16620,7 @@
           <p:nvPr/>
         </p:nvPicPr>
         <p:blipFill>
-          <a:blip r:embed="rId3">
+          <a:blip r:embed="rId3" cstate="print">
             <a:extLst>
               <a:ext uri="{28A0092B-C50C-407E-A947-70E740481C1C}">
                 <a14:useLocalDpi xmlns:a14="http://schemas.microsoft.com/office/drawing/2010/main" val="0"/>
@@ -16746,7 +16746,7 @@
           <p:nvPr/>
         </p:nvPicPr>
         <p:blipFill>
-          <a:blip r:embed="rId4">
+          <a:blip r:embed="rId4" cstate="print">
             <a:extLst>
               <a:ext uri="{28A0092B-C50C-407E-A947-70E740481C1C}">
                 <a14:useLocalDpi xmlns:a14="http://schemas.microsoft.com/office/drawing/2010/main" val="0"/>
@@ -16842,7 +16842,7 @@
           <p:nvPr/>
         </p:nvPicPr>
         <p:blipFill>
-          <a:blip r:embed="rId4">
+          <a:blip r:embed="rId4" cstate="print">
             <a:extLst>
               <a:ext uri="{28A0092B-C50C-407E-A947-70E740481C1C}">
                 <a14:useLocalDpi xmlns:a14="http://schemas.microsoft.com/office/drawing/2010/main" val="0"/>
@@ -16908,7 +16908,7 @@
           <p:nvPr/>
         </p:nvPicPr>
         <p:blipFill>
-          <a:blip r:embed="rId3">
+          <a:blip r:embed="rId3" cstate="print">
             <a:extLst>
               <a:ext uri="{28A0092B-C50C-407E-A947-70E740481C1C}">
                 <a14:useLocalDpi xmlns:a14="http://schemas.microsoft.com/office/drawing/2010/main" val="0"/>

</xml_diff>